<commit_message>
add demographic drop zone
</commit_message>
<xml_diff>
--- a/Table-One/FormatterTableOneWireframe.pptx
+++ b/Table-One/FormatterTableOneWireframe.pptx
@@ -5855,6 +5855,84 @@
           </a:p>
         </p:txBody>
       </p:sp>
+      <p:sp>
+        <p:nvSpPr>
+          <p:cNvPr id="3" name="TextBox 2">
+            <a:extLst>
+              <a:ext uri="{FF2B5EF4-FFF2-40B4-BE49-F238E27FC236}">
+                <a16:creationId xmlns:a16="http://schemas.microsoft.com/office/drawing/2014/main" id="{E45C2A37-6EE1-D021-A9C1-5653BD848C03}"/>
+              </a:ext>
+            </a:extLst>
+          </p:cNvPr>
+          <p:cNvSpPr txBox="1"/>
+          <p:nvPr/>
+        </p:nvSpPr>
+        <p:spPr>
+          <a:xfrm>
+            <a:off x="6115696" y="1785589"/>
+            <a:ext cx="1899259" cy="461665"/>
+          </a:xfrm>
+          <a:prstGeom prst="rect">
+            <a:avLst/>
+          </a:prstGeom>
+          <a:noFill/>
+          <a:ln w="28575">
+            <a:solidFill>
+              <a:schemeClr val="accent6"/>
+            </a:solidFill>
+          </a:ln>
+        </p:spPr>
+        <p:txBody>
+          <a:bodyPr wrap="square" rtlCol="0">
+            <a:spAutoFit/>
+          </a:bodyPr>
+          <a:lstStyle/>
+          <a:p>
+            <a:r>
+              <a:rPr lang="en-US" sz="1200" dirty="0"/>
+              <a:t>Drop Demographic csv for cohort</a:t>
+            </a:r>
+          </a:p>
+        </p:txBody>
+      </p:sp>
+      <p:cxnSp>
+        <p:nvCxnSpPr>
+          <p:cNvPr id="16" name="Straight Connector 15">
+            <a:extLst>
+              <a:ext uri="{FF2B5EF4-FFF2-40B4-BE49-F238E27FC236}">
+                <a16:creationId xmlns:a16="http://schemas.microsoft.com/office/drawing/2014/main" id="{6BAD4554-3BB7-F15C-8601-7CECAD35E941}"/>
+              </a:ext>
+            </a:extLst>
+          </p:cNvPr>
+          <p:cNvCxnSpPr>
+            <a:stCxn id="3" idx="3"/>
+          </p:cNvCxnSpPr>
+          <p:nvPr/>
+        </p:nvCxnSpPr>
+        <p:spPr>
+          <a:xfrm flipV="1">
+            <a:off x="8014955" y="1803995"/>
+            <a:ext cx="1897926" cy="212427"/>
+          </a:xfrm>
+          <a:prstGeom prst="line">
+            <a:avLst/>
+          </a:prstGeom>
+        </p:spPr>
+        <p:style>
+          <a:lnRef idx="2">
+            <a:schemeClr val="accent1"/>
+          </a:lnRef>
+          <a:fillRef idx="0">
+            <a:schemeClr val="accent1"/>
+          </a:fillRef>
+          <a:effectRef idx="1">
+            <a:schemeClr val="accent1"/>
+          </a:effectRef>
+          <a:fontRef idx="minor">
+            <a:schemeClr val="tx1"/>
+          </a:fontRef>
+        </p:style>
+      </p:cxnSp>
     </p:spTree>
     <p:extLst>
       <p:ext uri="{BB962C8B-B14F-4D97-AF65-F5344CB8AC3E}">
@@ -8083,19 +8161,14 @@
           <a:p>
             <a:r>
               <a:rPr lang="en-US" dirty="0"/>
-              <a:t>Allow up to 5 </a:t>
-            </a:r>
-            <a:r>
-              <a:rPr lang="en-US"/>
-              <a:t>additional </a:t>
-            </a:r>
-          </a:p>
-          <a:p>
-            <a:r>
-              <a:rPr lang="en-US"/>
+              <a:t>Allow up to 5 additional </a:t>
+            </a:r>
+          </a:p>
+          <a:p>
+            <a:r>
+              <a:rPr lang="en-US" dirty="0"/>
               <a:t>variables</a:t>
             </a:r>
-            <a:endParaRPr lang="en-US" dirty="0"/>
           </a:p>
         </p:txBody>
       </p:sp>

</xml_diff>